<commit_message>
Nuestro codigo final 7
</commit_message>
<xml_diff>
--- a/CodigoFinal/proyecto.pptx
+++ b/CodigoFinal/proyecto.pptx
@@ -5,17 +5,18 @@
     <p:sldMasterId id="2147483676" r:id="rId1"/>
   </p:sldMasterIdLst>
   <p:notesMasterIdLst>
-    <p:notesMasterId r:id="rId7"/>
+    <p:notesMasterId r:id="rId8"/>
   </p:notesMasterIdLst>
   <p:handoutMasterIdLst>
-    <p:handoutMasterId r:id="rId8"/>
+    <p:handoutMasterId r:id="rId9"/>
   </p:handoutMasterIdLst>
   <p:sldIdLst>
     <p:sldId id="260" r:id="rId2"/>
     <p:sldId id="257" r:id="rId3"/>
     <p:sldId id="258" r:id="rId4"/>
     <p:sldId id="259" r:id="rId5"/>
-    <p:sldId id="264" r:id="rId6"/>
+    <p:sldId id="266" r:id="rId6"/>
+    <p:sldId id="264" r:id="rId7"/>
   </p:sldIdLst>
   <p:sldSz cx="12192000" cy="6858000"/>
   <p:notesSz cx="6858000" cy="9144000"/>
@@ -152,7 +153,7 @@
           <p:cNvPr id="2" name="Marcador de encabezado 1">
             <a:extLst>
               <a:ext uri="{FF2B5EF4-FFF2-40B4-BE49-F238E27FC236}">
-                <a16:creationId xmlns:a16="http://schemas.microsoft.com/office/drawing/2014/main" xmlns="" id="{6FE7BB49-E310-4366-A0AE-74F0FB00EB98}"/>
+                <a16:creationId xmlns="" xmlns:a16="http://schemas.microsoft.com/office/drawing/2014/main" id="{6FE7BB49-E310-4366-A0AE-74F0FB00EB98}"/>
               </a:ext>
             </a:extLst>
           </p:cNvPr>
@@ -189,7 +190,7 @@
           <p:cNvPr id="3" name="Marcador de fecha 2">
             <a:extLst>
               <a:ext uri="{FF2B5EF4-FFF2-40B4-BE49-F238E27FC236}">
-                <a16:creationId xmlns:a16="http://schemas.microsoft.com/office/drawing/2014/main" xmlns="" id="{130AC23F-1A52-4F85-B0A6-79094BAAA814}"/>
+                <a16:creationId xmlns="" xmlns:a16="http://schemas.microsoft.com/office/drawing/2014/main" id="{130AC23F-1A52-4F85-B0A6-79094BAAA814}"/>
               </a:ext>
             </a:extLst>
           </p:cNvPr>
@@ -219,7 +220,7 @@
           <a:p>
             <a:fld id="{DABDD729-C1CB-4B65-B69C-8C4C8DDFA33E}" type="datetime1">
               <a:rPr lang="es-ES" smtClean="0"/>
-              <a:t>04/12/2018</a:t>
+              <a:t>05/12/2018</a:t>
             </a:fld>
             <a:endParaRPr lang="es-ES" dirty="0"/>
           </a:p>
@@ -230,7 +231,7 @@
           <p:cNvPr id="4" name="Marcador de pie de página 3">
             <a:extLst>
               <a:ext uri="{FF2B5EF4-FFF2-40B4-BE49-F238E27FC236}">
-                <a16:creationId xmlns:a16="http://schemas.microsoft.com/office/drawing/2014/main" xmlns="" id="{3F8693A1-860F-45D0-BC1F-B07C0A3888AA}"/>
+                <a16:creationId xmlns="" xmlns:a16="http://schemas.microsoft.com/office/drawing/2014/main" id="{3F8693A1-860F-45D0-BC1F-B07C0A3888AA}"/>
               </a:ext>
             </a:extLst>
           </p:cNvPr>
@@ -267,7 +268,7 @@
           <p:cNvPr id="5" name="Marcador de número de diapositiva 4">
             <a:extLst>
               <a:ext uri="{FF2B5EF4-FFF2-40B4-BE49-F238E27FC236}">
-                <a16:creationId xmlns:a16="http://schemas.microsoft.com/office/drawing/2014/main" xmlns="" id="{16A0D8AB-60F6-4D0B-B895-08BC9F259EBC}"/>
+                <a16:creationId xmlns="" xmlns:a16="http://schemas.microsoft.com/office/drawing/2014/main" id="{16A0D8AB-60F6-4D0B-B895-08BC9F259EBC}"/>
               </a:ext>
             </a:extLst>
           </p:cNvPr>
@@ -397,7 +398,7 @@
             <a:fld id="{585B8656-90F7-471A-AAFA-A8B88E24943E}" type="datetime1">
               <a:rPr lang="es-ES" smtClean="0"/>
               <a:pPr/>
-              <a:t>04/12/2018</a:t>
+              <a:t>05/12/2018</a:t>
             </a:fld>
             <a:endParaRPr lang="es-ES" dirty="0"/>
           </a:p>
@@ -940,7 +941,7 @@
             <a:fld id="{95D09BB1-6366-46B5-8076-EC06C278A398}" type="datetime1">
               <a:rPr lang="es-ES" smtClean="0"/>
               <a:pPr/>
-              <a:t>04/12/2018</a:t>
+              <a:t>05/12/2018</a:t>
             </a:fld>
             <a:endParaRPr lang="es-ES" dirty="0"/>
           </a:p>
@@ -1379,7 +1380,7 @@
             <a:fld id="{95D09BB1-6366-46B5-8076-EC06C278A398}" type="datetime1">
               <a:rPr lang="es-ES" smtClean="0"/>
               <a:pPr/>
-              <a:t>04/12/2018</a:t>
+              <a:t>05/12/2018</a:t>
             </a:fld>
             <a:endParaRPr lang="es-ES" dirty="0"/>
           </a:p>
@@ -1632,7 +1633,7 @@
             <a:fld id="{95D09BB1-6366-46B5-8076-EC06C278A398}" type="datetime1">
               <a:rPr lang="es-ES" smtClean="0"/>
               <a:pPr/>
-              <a:t>04/12/2018</a:t>
+              <a:t>05/12/2018</a:t>
             </a:fld>
             <a:endParaRPr lang="es-ES" dirty="0"/>
           </a:p>
@@ -1943,7 +1944,7 @@
             <a:fld id="{95D09BB1-6366-46B5-8076-EC06C278A398}" type="datetime1">
               <a:rPr lang="es-ES" smtClean="0"/>
               <a:pPr/>
-              <a:t>04/12/2018</a:t>
+              <a:t>05/12/2018</a:t>
             </a:fld>
             <a:endParaRPr lang="es-ES" dirty="0"/>
           </a:p>
@@ -2264,7 +2265,7 @@
             <a:fld id="{95D09BB1-6366-46B5-8076-EC06C278A398}" type="datetime1">
               <a:rPr lang="es-ES" smtClean="0"/>
               <a:pPr/>
-              <a:t>04/12/2018</a:t>
+              <a:t>05/12/2018</a:t>
             </a:fld>
             <a:endParaRPr lang="es-ES" dirty="0"/>
           </a:p>
@@ -2569,7 +2570,7 @@
             <a:fld id="{95D09BB1-6366-46B5-8076-EC06C278A398}" type="datetime1">
               <a:rPr lang="es-ES" smtClean="0"/>
               <a:pPr/>
-              <a:t>04/12/2018</a:t>
+              <a:t>05/12/2018</a:t>
             </a:fld>
             <a:endParaRPr lang="es-ES" dirty="0"/>
           </a:p>
@@ -2939,7 +2940,7 @@
             <a:fld id="{95D09BB1-6366-46B5-8076-EC06C278A398}" type="datetime1">
               <a:rPr lang="es-ES" smtClean="0"/>
               <a:pPr/>
-              <a:t>04/12/2018</a:t>
+              <a:t>05/12/2018</a:t>
             </a:fld>
             <a:endParaRPr lang="es-ES" dirty="0"/>
           </a:p>
@@ -3116,7 +3117,7 @@
             <a:fld id="{95D09BB1-6366-46B5-8076-EC06C278A398}" type="datetime1">
               <a:rPr lang="es-ES" smtClean="0"/>
               <a:pPr/>
-              <a:t>04/12/2018</a:t>
+              <a:t>05/12/2018</a:t>
             </a:fld>
             <a:endParaRPr lang="es-ES" dirty="0"/>
           </a:p>
@@ -3299,7 +3300,7 @@
             <a:fld id="{95D09BB1-6366-46B5-8076-EC06C278A398}" type="datetime1">
               <a:rPr lang="es-ES" smtClean="0"/>
               <a:pPr/>
-              <a:t>04/12/2018</a:t>
+              <a:t>05/12/2018</a:t>
             </a:fld>
             <a:endParaRPr lang="es-ES" dirty="0"/>
           </a:p>
@@ -3472,7 +3473,7 @@
             <a:fld id="{95D09BB1-6366-46B5-8076-EC06C278A398}" type="datetime1">
               <a:rPr lang="es-ES" smtClean="0"/>
               <a:pPr/>
-              <a:t>04/12/2018</a:t>
+              <a:t>05/12/2018</a:t>
             </a:fld>
             <a:endParaRPr lang="es-ES" dirty="0"/>
           </a:p>
@@ -3725,7 +3726,7 @@
             <a:fld id="{95D09BB1-6366-46B5-8076-EC06C278A398}" type="datetime1">
               <a:rPr lang="es-ES" smtClean="0"/>
               <a:pPr/>
-              <a:t>04/12/2018</a:t>
+              <a:t>05/12/2018</a:t>
             </a:fld>
             <a:endParaRPr lang="es-ES" dirty="0"/>
           </a:p>
@@ -3964,7 +3965,7 @@
             <a:fld id="{95D09BB1-6366-46B5-8076-EC06C278A398}" type="datetime1">
               <a:rPr lang="es-ES" smtClean="0"/>
               <a:pPr/>
-              <a:t>04/12/2018</a:t>
+              <a:t>05/12/2018</a:t>
             </a:fld>
             <a:endParaRPr lang="es-ES" dirty="0"/>
           </a:p>
@@ -4349,7 +4350,7 @@
             <a:fld id="{95D09BB1-6366-46B5-8076-EC06C278A398}" type="datetime1">
               <a:rPr lang="es-ES" smtClean="0"/>
               <a:pPr/>
-              <a:t>04/12/2018</a:t>
+              <a:t>05/12/2018</a:t>
             </a:fld>
             <a:endParaRPr lang="es-ES" dirty="0"/>
           </a:p>
@@ -4470,7 +4471,7 @@
             <a:fld id="{95D09BB1-6366-46B5-8076-EC06C278A398}" type="datetime1">
               <a:rPr lang="es-ES" smtClean="0"/>
               <a:pPr/>
-              <a:t>04/12/2018</a:t>
+              <a:t>05/12/2018</a:t>
             </a:fld>
             <a:endParaRPr lang="es-ES" dirty="0"/>
           </a:p>
@@ -4568,7 +4569,7 @@
             <a:fld id="{F9891CCC-F876-4E9A-9F42-148D2A41F205}" type="datetime1">
               <a:rPr lang="es-ES" smtClean="0"/>
               <a:pPr/>
-              <a:t>04/12/2018</a:t>
+              <a:t>05/12/2018</a:t>
             </a:fld>
             <a:endParaRPr lang="es-ES" dirty="0"/>
           </a:p>
@@ -4826,7 +4827,7 @@
             <a:fld id="{95D09BB1-6366-46B5-8076-EC06C278A398}" type="datetime1">
               <a:rPr lang="es-ES" smtClean="0"/>
               <a:pPr/>
-              <a:t>04/12/2018</a:t>
+              <a:t>05/12/2018</a:t>
             </a:fld>
             <a:endParaRPr lang="es-ES" dirty="0"/>
           </a:p>
@@ -5112,7 +5113,7 @@
             <a:fld id="{95D09BB1-6366-46B5-8076-EC06C278A398}" type="datetime1">
               <a:rPr lang="es-ES" smtClean="0"/>
               <a:pPr/>
-              <a:t>04/12/2018</a:t>
+              <a:t>05/12/2018</a:t>
             </a:fld>
             <a:endParaRPr lang="es-ES" dirty="0"/>
           </a:p>
@@ -5521,7 +5522,7 @@
             <a:fld id="{B61BEF0D-F0BB-DE4B-95CE-6DB70DBA9567}" type="datetimeFigureOut">
               <a:rPr lang="en-US" dirty="0"/>
               <a:pPr/>
-              <a:t>12/4/2018</a:t>
+              <a:t>12/5/2018</a:t>
             </a:fld>
             <a:endParaRPr lang="en-US" dirty="0"/>
           </a:p>
@@ -6147,13 +6148,13 @@
   <p:clrMapOvr>
     <a:masterClrMapping/>
   </p:clrMapOvr>
-  <mc:AlternateContent xmlns:mc="http://schemas.openxmlformats.org/markup-compatibility/2006">
-    <mc:Choice xmlns:p14="http://schemas.microsoft.com/office/powerpoint/2010/main" Requires="p14">
+  <mc:AlternateContent xmlns:mc="http://schemas.openxmlformats.org/markup-compatibility/2006" xmlns:p14="http://schemas.microsoft.com/office/powerpoint/2010/main">
+    <mc:Choice Requires="p14">
       <p:transition spd="slow" p14:dur="1600" advTm="6">
         <p14:gallery dir="l"/>
       </p:transition>
     </mc:Choice>
-    <mc:Fallback>
+    <mc:Fallback xmlns="">
       <p:transition spd="slow" advTm="6">
         <p:fade/>
       </p:transition>
@@ -6217,11 +6218,7 @@
           <a:p>
             <a:r>
               <a:rPr lang="es-PE" sz="5400" dirty="0" smtClean="0"/>
-              <a:t>Introducción y </a:t>
-            </a:r>
-            <a:r>
-              <a:rPr lang="es-PE" sz="5400" dirty="0" smtClean="0"/>
-              <a:t>descripción:</a:t>
+              <a:t>Introducción y descripción:</a:t>
             </a:r>
             <a:endParaRPr lang="es-PE" sz="5400" dirty="0"/>
           </a:p>
@@ -6259,13 +6256,8 @@
             </a:r>
             <a:r>
               <a:rPr lang="es-PE" sz="2000" dirty="0" smtClean="0"/>
-              <a:t>se encargará de mostrar a la gente si un producto esta disponible por ejemplo monitores, teclados, procesadores, etc</a:t>
-            </a:r>
-            <a:r>
-              <a:rPr lang="es-PE" sz="2000" dirty="0" smtClean="0"/>
-              <a:t>. A parte de eso la empresa te mostrará el precio del producto disponible.</a:t>
-            </a:r>
-            <a:endParaRPr lang="es-PE" sz="2000" dirty="0" smtClean="0"/>
+              <a:t>se encargará de mostrar a la gente si un producto esta disponible por ejemplo monitores, teclados, procesadores, etc. A parte de eso la empresa te mostrará el precio del producto disponible.</a:t>
+            </a:r>
           </a:p>
         </p:txBody>
       </p:sp>
@@ -6303,13 +6295,13 @@
   <p:clrMapOvr>
     <a:masterClrMapping/>
   </p:clrMapOvr>
-  <mc:AlternateContent xmlns:mc="http://schemas.openxmlformats.org/markup-compatibility/2006">
-    <mc:Choice xmlns:p14="http://schemas.microsoft.com/office/powerpoint/2010/main" Requires="p14">
+  <mc:AlternateContent xmlns:mc="http://schemas.openxmlformats.org/markup-compatibility/2006" xmlns:p14="http://schemas.microsoft.com/office/powerpoint/2010/main">
+    <mc:Choice Requires="p14">
       <p:transition spd="slow" p14:dur="4000" advTm="34">
         <p14:vortex dir="r"/>
       </p:transition>
     </mc:Choice>
-    <mc:Fallback>
+    <mc:Fallback xmlns="">
       <p:transition spd="slow" advTm="34">
         <p:fade/>
       </p:transition>
@@ -6373,11 +6365,7 @@
           <a:p>
             <a:r>
               <a:rPr lang="es-ES" sz="7200" dirty="0" smtClean="0"/>
-              <a:t>Conceptos </a:t>
-            </a:r>
-            <a:r>
-              <a:rPr lang="es-ES" sz="7200" dirty="0" smtClean="0"/>
-              <a:t>utilizados:</a:t>
+              <a:t>Conceptos utilizados:</a:t>
             </a:r>
             <a:endParaRPr lang="es-PE" sz="7200" dirty="0"/>
           </a:p>
@@ -6422,7 +6410,6 @@
               <a:rPr lang="es-PE" sz="2800" dirty="0" smtClean="0"/>
               <a:t>- Condicional switch.</a:t>
             </a:r>
-            <a:endParaRPr lang="es-PE" sz="2800" dirty="0" smtClean="0"/>
           </a:p>
           <a:p>
             <a:r>
@@ -6499,13 +6486,13 @@
   <p:clrMapOvr>
     <a:masterClrMapping/>
   </p:clrMapOvr>
-  <mc:AlternateContent xmlns:mc="http://schemas.openxmlformats.org/markup-compatibility/2006">
-    <mc:Choice xmlns:p14="http://schemas.microsoft.com/office/powerpoint/2010/main" Requires="p14">
+  <mc:AlternateContent xmlns:mc="http://schemas.openxmlformats.org/markup-compatibility/2006" xmlns:p14="http://schemas.microsoft.com/office/powerpoint/2010/main">
+    <mc:Choice Requires="p14">
       <p:transition spd="slow" p14:dur="1250" advTm="497">
         <p14:switch dir="r"/>
       </p:transition>
     </mc:Choice>
-    <mc:Fallback>
+    <mc:Fallback xmlns="">
       <p:transition spd="slow" advTm="497">
         <p:fade/>
       </p:transition>
@@ -6690,13 +6677,13 @@
   <p:clrMapOvr>
     <a:masterClrMapping/>
   </p:clrMapOvr>
-  <mc:AlternateContent xmlns:mc="http://schemas.openxmlformats.org/markup-compatibility/2006">
-    <mc:Choice xmlns:p14="http://schemas.microsoft.com/office/powerpoint/2010/main" Requires="p14">
+  <mc:AlternateContent xmlns:mc="http://schemas.openxmlformats.org/markup-compatibility/2006" xmlns:p14="http://schemas.microsoft.com/office/powerpoint/2010/main">
+    <mc:Choice Requires="p14">
       <p:transition spd="slow" p14:dur="1250" advTm="553">
         <p14:flip dir="r"/>
       </p:transition>
     </mc:Choice>
-    <mc:Fallback>
+    <mc:Fallback xmlns="">
       <p:transition spd="slow" advTm="553">
         <p:fade/>
       </p:transition>
@@ -6713,6 +6700,167 @@
 </file>
 
 <file path=ppt/slides/slide5.xml><?xml version="1.0" encoding="utf-8"?>
+<p:sld xmlns:a="http://schemas.openxmlformats.org/drawingml/2006/main" xmlns:r="http://schemas.openxmlformats.org/officeDocument/2006/relationships" xmlns:p="http://schemas.openxmlformats.org/presentationml/2006/main">
+  <p:cSld>
+    <p:bg>
+      <p:bgPr>
+        <a:gradFill rotWithShape="1">
+          <a:gsLst>
+            <a:gs pos="100000">
+              <a:schemeClr val="bg1"/>
+            </a:gs>
+            <a:gs pos="100000">
+              <a:schemeClr val="bg2">
+                <a:shade val="96000"/>
+                <a:satMod val="120000"/>
+                <a:lumMod val="90000"/>
+              </a:schemeClr>
+            </a:gs>
+          </a:gsLst>
+          <a:lin ang="6120000" scaled="1"/>
+        </a:gradFill>
+        <a:effectLst/>
+      </p:bgPr>
+    </p:bg>
+    <p:spTree>
+      <p:nvGrpSpPr>
+        <p:cNvPr id="1" name=""/>
+        <p:cNvGrpSpPr/>
+        <p:nvPr/>
+      </p:nvGrpSpPr>
+      <p:grpSpPr>
+        <a:xfrm>
+          <a:off x="0" y="0"/>
+          <a:ext cx="0" cy="0"/>
+          <a:chOff x="0" y="0"/>
+          <a:chExt cx="0" cy="0"/>
+        </a:xfrm>
+      </p:grpSpPr>
+      <p:sp>
+        <p:nvSpPr>
+          <p:cNvPr id="2" name="Rectángulo 1"/>
+          <p:cNvSpPr/>
+          <p:nvPr/>
+        </p:nvSpPr>
+        <p:spPr>
+          <a:xfrm>
+            <a:off x="415421" y="138064"/>
+            <a:ext cx="3485762" cy="1107996"/>
+          </a:xfrm>
+          <a:prstGeom prst="rect">
+            <a:avLst/>
+          </a:prstGeom>
+        </p:spPr>
+        <p:txBody>
+          <a:bodyPr wrap="none">
+            <a:spAutoFit/>
+          </a:bodyPr>
+          <a:lstStyle/>
+          <a:p>
+            <a:r>
+              <a:rPr lang="es-ES" sz="6600" dirty="0" smtClean="0">
+                <a:solidFill>
+                  <a:schemeClr val="bg1"/>
+                </a:solidFill>
+              </a:rPr>
+              <a:t>Propósito</a:t>
+            </a:r>
+            <a:endParaRPr lang="es-PE" sz="2000" dirty="0"/>
+          </a:p>
+        </p:txBody>
+      </p:sp>
+      <p:sp>
+        <p:nvSpPr>
+          <p:cNvPr id="3" name="Rectángulo 2"/>
+          <p:cNvSpPr/>
+          <p:nvPr/>
+        </p:nvSpPr>
+        <p:spPr>
+          <a:xfrm>
+            <a:off x="705142" y="588080"/>
+            <a:ext cx="6847563" cy="830997"/>
+          </a:xfrm>
+          <a:prstGeom prst="rect">
+            <a:avLst/>
+          </a:prstGeom>
+        </p:spPr>
+        <p:txBody>
+          <a:bodyPr wrap="square">
+            <a:spAutoFit/>
+          </a:bodyPr>
+          <a:lstStyle/>
+          <a:p>
+            <a:r>
+              <a:rPr lang="es-PE" sz="4800" dirty="0" smtClean="0"/>
+              <a:t>Diagrama de Flujo:</a:t>
+            </a:r>
+            <a:endParaRPr lang="es-PE" sz="4800" dirty="0"/>
+          </a:p>
+        </p:txBody>
+      </p:sp>
+      <p:pic>
+        <p:nvPicPr>
+          <p:cNvPr id="5" name="Imagen 4"/>
+          <p:cNvPicPr>
+            <a:picLocks noChangeAspect="1"/>
+          </p:cNvPicPr>
+          <p:nvPr/>
+        </p:nvPicPr>
+        <p:blipFill>
+          <a:blip r:embed="rId2">
+            <a:extLst>
+              <a:ext uri="{28A0092B-C50C-407E-A947-70E740481C1C}">
+                <a14:useLocalDpi xmlns:a14="http://schemas.microsoft.com/office/drawing/2010/main" val="0"/>
+              </a:ext>
+            </a:extLst>
+          </a:blip>
+          <a:stretch>
+            <a:fillRect/>
+          </a:stretch>
+        </p:blipFill>
+        <p:spPr>
+          <a:xfrm>
+            <a:off x="819397" y="1869093"/>
+            <a:ext cx="10058400" cy="4193341"/>
+          </a:xfrm>
+          <a:prstGeom prst="rect">
+            <a:avLst/>
+          </a:prstGeom>
+        </p:spPr>
+      </p:pic>
+    </p:spTree>
+    <p:extLst>
+      <p:ext uri="{BB962C8B-B14F-4D97-AF65-F5344CB8AC3E}">
+        <p14:creationId xmlns:p14="http://schemas.microsoft.com/office/powerpoint/2010/main" val="696305893"/>
+      </p:ext>
+    </p:extLst>
+  </p:cSld>
+  <p:clrMapOvr>
+    <a:masterClrMapping/>
+  </p:clrMapOvr>
+  <mc:AlternateContent xmlns:mc="http://schemas.openxmlformats.org/markup-compatibility/2006" xmlns:p14="http://schemas.microsoft.com/office/powerpoint/2010/main">
+    <mc:Choice Requires="p14">
+      <p:transition spd="slow" p14:dur="1250" advTm="553">
+        <p14:flip dir="r"/>
+      </p:transition>
+    </mc:Choice>
+    <mc:Fallback xmlns="">
+      <p:transition spd="slow" advTm="553">
+        <p:fade/>
+      </p:transition>
+    </mc:Fallback>
+  </mc:AlternateContent>
+  <p:timing>
+    <p:tnLst>
+      <p:par>
+        <p:cTn id="1" dur="indefinite" restart="never" nodeType="tmRoot"/>
+      </p:par>
+    </p:tnLst>
+  </p:timing>
+</p:sld>
+</file>
+
+<file path=ppt/slides/slide6.xml><?xml version="1.0" encoding="utf-8"?>
 <p:sld xmlns:a="http://schemas.openxmlformats.org/drawingml/2006/main" xmlns:r="http://schemas.openxmlformats.org/officeDocument/2006/relationships" xmlns:p="http://schemas.openxmlformats.org/presentationml/2006/main">
   <p:cSld>
     <p:bg>
@@ -6777,13 +6925,13 @@
   <p:clrMapOvr>
     <a:masterClrMapping/>
   </p:clrMapOvr>
-  <mc:AlternateContent xmlns:mc="http://schemas.openxmlformats.org/markup-compatibility/2006">
-    <mc:Choice xmlns:p14="http://schemas.microsoft.com/office/powerpoint/2010/main" Requires="p14">
+  <mc:AlternateContent xmlns:mc="http://schemas.openxmlformats.org/markup-compatibility/2006" xmlns:p14="http://schemas.microsoft.com/office/powerpoint/2010/main">
+    <mc:Choice Requires="p14">
       <p:transition spd="slow" p14:dur="1400" advTm="506">
         <p14:doors dir="vert"/>
       </p:transition>
     </mc:Choice>
-    <mc:Fallback>
+    <mc:Fallback xmlns="">
       <p:transition spd="slow" advTm="506">
         <p:fade/>
       </p:transition>

</xml_diff>